<commit_message>
minor changes to two PowerPoint slides
</commit_message>
<xml_diff>
--- a/PowerPoints/01 - Overview of Compilers.pptx
+++ b/PowerPoints/01 - Overview of Compilers.pptx
@@ -40,7 +40,7 @@
     <p:sldId id="316" r:id="rId28"/>
     <p:sldId id="317" r:id="rId29"/>
     <p:sldId id="305" r:id="rId30"/>
-    <p:sldId id="304" r:id="rId31"/>
+    <p:sldId id="322" r:id="rId31"/>
     <p:sldId id="280" r:id="rId32"/>
     <p:sldId id="283" r:id="rId33"/>
     <p:sldId id="318" r:id="rId34"/>
@@ -19439,10 +19439,10 @@
           </p:nvGrpSpPr>
           <p:grpSpPr bwMode="auto">
             <a:xfrm>
-              <a:off x="2244725" y="4481513"/>
-              <a:ext cx="1462087" cy="730250"/>
-              <a:chOff x="624" y="2544"/>
-              <a:chExt cx="921" cy="460"/>
+              <a:off x="2222500" y="4481513"/>
+              <a:ext cx="1497012" cy="730250"/>
+              <a:chOff x="610" y="2544"/>
+              <a:chExt cx="943" cy="460"/>
             </a:xfrm>
           </p:grpSpPr>
           <p:grpSp>
@@ -19781,8 +19781,8 @@
             </p:nvSpPr>
             <p:spPr bwMode="auto">
               <a:xfrm>
-                <a:off x="686" y="2557"/>
-                <a:ext cx="795" cy="204"/>
+                <a:off x="610" y="2557"/>
+                <a:ext cx="943" cy="204"/>
               </a:xfrm>
               <a:prstGeom prst="rect">
                 <a:avLst/>
@@ -19809,7 +19809,7 @@
                   <a:rPr lang="en-US" sz="1500" dirty="0">
                     <a:sym typeface="Symbol" pitchFamily="18" charset="2"/>
                   </a:rPr>
-                  <a:t> ARM</a:t>
+                  <a:t> RISC-V</a:t>
                 </a:r>
               </a:p>
             </p:txBody>
@@ -31644,16 +31644,22 @@
       </p:sp>
       <p:grpSp>
         <p:nvGrpSpPr>
-          <p:cNvPr id="2" name="Group 1"/>
+          <p:cNvPr id="5" name="Group 4">
+            <a:extLst>
+              <a:ext uri="{FF2B5EF4-FFF2-40B4-BE49-F238E27FC236}">
+                <a16:creationId xmlns:a16="http://schemas.microsoft.com/office/drawing/2014/main" id="{07264B80-FD5F-5540-93D7-B398B61B6141}"/>
+              </a:ext>
+            </a:extLst>
+          </p:cNvPr>
           <p:cNvGrpSpPr/>
           <p:nvPr/>
         </p:nvGrpSpPr>
         <p:grpSpPr>
           <a:xfrm>
-            <a:off x="1269100" y="3715138"/>
-            <a:ext cx="6605800" cy="2551743"/>
-            <a:chOff x="1371478" y="3733800"/>
-            <a:chExt cx="6605800" cy="2551743"/>
+            <a:off x="924086" y="3657600"/>
+            <a:ext cx="7295828" cy="2490188"/>
+            <a:chOff x="1371468" y="3715138"/>
+            <a:chExt cx="7295828" cy="2490188"/>
           </a:xfrm>
         </p:grpSpPr>
         <p:grpSp>
@@ -31666,7 +31672,7 @@
           </p:nvGrpSpPr>
           <p:grpSpPr bwMode="auto">
             <a:xfrm>
-              <a:off x="2429328" y="3733800"/>
+              <a:off x="2326950" y="3715138"/>
               <a:ext cx="1462088" cy="730250"/>
               <a:chOff x="624" y="2544"/>
               <a:chExt cx="921" cy="460"/>
@@ -32029,11 +32035,11 @@
               <a:lstStyle/>
               <a:p>
                 <a:r>
-                  <a:rPr lang="en-US" sz="1500"/>
+                  <a:rPr lang="en-US" sz="1500" dirty="0"/>
                   <a:t>C++ </a:t>
                 </a:r>
                 <a:r>
-                  <a:rPr lang="en-US" sz="1500">
+                  <a:rPr lang="en-US" sz="1500" dirty="0">
                     <a:sym typeface="Symbol" pitchFamily="18" charset="2"/>
                   </a:rPr>
                   <a:t> M</a:t>
@@ -32052,7 +32058,7 @@
           </p:nvGrpSpPr>
           <p:grpSpPr bwMode="auto">
             <a:xfrm>
-              <a:off x="3616778" y="4098925"/>
+              <a:off x="3514400" y="4080263"/>
               <a:ext cx="1462088" cy="730250"/>
               <a:chOff x="624" y="2544"/>
               <a:chExt cx="921" cy="460"/>
@@ -32438,7 +32444,7 @@
           </p:nvGrpSpPr>
           <p:grpSpPr bwMode="auto">
             <a:xfrm>
-              <a:off x="4804228" y="3733800"/>
+              <a:off x="4701850" y="3715138"/>
               <a:ext cx="1462088" cy="730250"/>
               <a:chOff x="624" y="2544"/>
               <a:chExt cx="921" cy="460"/>
@@ -32824,8 +32830,8 @@
           </p:nvSpPr>
           <p:spPr bwMode="auto">
             <a:xfrm>
-              <a:off x="1371478" y="4802188"/>
-              <a:ext cx="2233175" cy="708528"/>
+              <a:off x="1371468" y="4783526"/>
+              <a:ext cx="2028439" cy="646973"/>
             </a:xfrm>
             <a:prstGeom prst="rect">
               <a:avLst/>
@@ -32845,13 +32851,13 @@
             <a:lstStyle/>
             <a:p>
               <a:r>
-                <a:rPr lang="en-US" sz="2000" dirty="0"/>
+                <a:rPr lang="en-US" sz="1800" dirty="0"/>
                 <a:t>Rewritten to</a:t>
               </a:r>
             </a:p>
             <a:p>
               <a:r>
-                <a:rPr lang="en-US" sz="2000" dirty="0"/>
+                <a:rPr lang="en-US" sz="1800" dirty="0"/>
                 <a:t>improve efficiency</a:t>
               </a:r>
             </a:p>
@@ -32867,8 +32873,8 @@
           </p:nvSpPr>
           <p:spPr bwMode="auto">
             <a:xfrm>
-              <a:off x="5689600" y="4724400"/>
-              <a:ext cx="2287678" cy="1016305"/>
+              <a:off x="5587222" y="4705738"/>
+              <a:ext cx="3080074" cy="1477970"/>
             </a:xfrm>
             <a:prstGeom prst="rect">
               <a:avLst/>
@@ -32889,22 +32895,36 @@
             <a:p>
               <a:pPr algn="l"/>
               <a:r>
-                <a:rPr lang="en-US" sz="2000" dirty="0"/>
-                <a:t>This version is</a:t>
+                <a:rPr lang="en-US" sz="1800" dirty="0"/>
+                <a:t>This version generates</a:t>
               </a:r>
             </a:p>
             <a:p>
               <a:pPr algn="l"/>
               <a:r>
-                <a:rPr lang="en-US" sz="2000" dirty="0"/>
-                <a:t>more efficient than</a:t>
+                <a:rPr lang="en-US" sz="1800" dirty="0"/>
+                <a:t>more efficient code than</a:t>
               </a:r>
             </a:p>
             <a:p>
               <a:pPr algn="l"/>
               <a:r>
-                <a:rPr lang="en-US" sz="2000" dirty="0"/>
-                <a:t>this version</a:t>
+                <a:rPr lang="en-US" sz="1800" dirty="0"/>
+                <a:t>this version.  Use it to</a:t>
+              </a:r>
+            </a:p>
+            <a:p>
+              <a:pPr algn="l"/>
+              <a:r>
+                <a:rPr lang="en-US" sz="1800" dirty="0"/>
+                <a:t>recompile the C++ version</a:t>
+              </a:r>
+            </a:p>
+            <a:p>
+              <a:pPr algn="l"/>
+              <a:r>
+                <a:rPr lang="en-US" sz="1800" dirty="0"/>
+                <a:t>for a more efficient compiler.</a:t>
               </a:r>
             </a:p>
           </p:txBody>
@@ -32919,7 +32939,7 @@
           </p:nvSpPr>
           <p:spPr bwMode="auto">
             <a:xfrm>
-              <a:off x="3115128" y="4375150"/>
+              <a:off x="3012750" y="4356488"/>
               <a:ext cx="92075" cy="92075"/>
             </a:xfrm>
             <a:prstGeom prst="diamond">
@@ -32951,7 +32971,7 @@
           </p:nvSpPr>
           <p:spPr bwMode="auto">
             <a:xfrm>
-              <a:off x="5477328" y="4375150"/>
+              <a:off x="5374950" y="4356488"/>
               <a:ext cx="92075" cy="92075"/>
             </a:xfrm>
             <a:prstGeom prst="diamond">
@@ -32985,7 +33005,7 @@
           </p:nvCxnSpPr>
           <p:spPr bwMode="auto">
             <a:xfrm rot="5400000" flipH="1" flipV="1">
-              <a:off x="2657135" y="4298157"/>
+              <a:off x="2554757" y="4279495"/>
               <a:ext cx="334963" cy="673100"/>
             </a:xfrm>
             <a:prstGeom prst="bentConnector3">
@@ -33009,15 +33029,15 @@
             <p:cNvPr id="33807" name="AutoShape 48"/>
             <p:cNvCxnSpPr>
               <a:cxnSpLocks noChangeShapeType="1"/>
-              <a:stCxn id="33808" idx="1"/>
+              <a:stCxn id="3" idx="1"/>
               <a:endCxn id="33805" idx="2"/>
             </p:cNvCxnSpPr>
             <p:nvPr/>
           </p:nvCxnSpPr>
           <p:spPr bwMode="auto">
             <a:xfrm rot="10800000">
-              <a:off x="5523366" y="4467226"/>
-              <a:ext cx="196622" cy="496809"/>
+              <a:off x="5420988" y="4448564"/>
+              <a:ext cx="187332" cy="456923"/>
             </a:xfrm>
             <a:prstGeom prst="bentConnector2">
               <a:avLst/>
@@ -33043,7 +33063,7 @@
           </p:nvSpPr>
           <p:spPr bwMode="auto">
             <a:xfrm>
-              <a:off x="5719988" y="4917996"/>
+              <a:off x="5638708" y="4899334"/>
               <a:ext cx="92075" cy="92075"/>
             </a:xfrm>
             <a:prstGeom prst="diamond">
@@ -33075,7 +33095,7 @@
           </p:nvSpPr>
           <p:spPr bwMode="auto">
             <a:xfrm>
-              <a:off x="5719988" y="5486400"/>
+              <a:off x="5617610" y="5467738"/>
               <a:ext cx="92075" cy="92075"/>
             </a:xfrm>
             <a:prstGeom prst="diamond">
@@ -33109,7 +33129,7 @@
           </p:nvCxnSpPr>
           <p:spPr bwMode="auto">
             <a:xfrm rot="10800000">
-              <a:off x="4805136" y="4641702"/>
+              <a:off x="4702758" y="4623040"/>
               <a:ext cx="914852" cy="890736"/>
             </a:xfrm>
             <a:prstGeom prst="bentConnector3">
@@ -33138,8 +33158,8 @@
           </p:nvSpPr>
           <p:spPr bwMode="auto">
             <a:xfrm>
-              <a:off x="1682639" y="5577015"/>
-              <a:ext cx="2096728" cy="708528"/>
+              <a:off x="1676441" y="5558353"/>
+              <a:ext cx="1904367" cy="646973"/>
             </a:xfrm>
             <a:prstGeom prst="rect">
               <a:avLst/>
@@ -33159,13 +33179,13 @@
             <a:lstStyle/>
             <a:p>
               <a:r>
-                <a:rPr lang="en-US" sz="2000" dirty="0"/>
+                <a:rPr lang="en-US" sz="1800" dirty="0"/>
                 <a:t>Compile it using</a:t>
               </a:r>
             </a:p>
             <a:p>
               <a:r>
-                <a:rPr lang="en-US" sz="2000" dirty="0"/>
+                <a:rPr lang="en-US" sz="1800" dirty="0"/>
                 <a:t>existing compiler</a:t>
               </a:r>
             </a:p>
@@ -33183,8 +33203,8 @@
           </p:nvCxnSpPr>
           <p:spPr bwMode="auto">
             <a:xfrm flipV="1">
-              <a:off x="3779367" y="5563086"/>
-              <a:ext cx="568795" cy="368193"/>
+              <a:off x="3580808" y="5544424"/>
+              <a:ext cx="664976" cy="337416"/>
             </a:xfrm>
             <a:prstGeom prst="bentConnector2">
               <a:avLst/>
@@ -33210,7 +33230,7 @@
           </p:nvSpPr>
           <p:spPr bwMode="auto">
             <a:xfrm>
-              <a:off x="4713061" y="4595664"/>
+              <a:off x="4610683" y="4577002"/>
               <a:ext cx="92075" cy="92075"/>
             </a:xfrm>
             <a:prstGeom prst="diamond">
@@ -33240,7 +33260,7 @@
           </p:nvSpPr>
           <p:spPr bwMode="auto">
             <a:xfrm>
-              <a:off x="3890962" y="4831566"/>
+              <a:off x="3788584" y="4812904"/>
               <a:ext cx="914400" cy="731520"/>
             </a:xfrm>
             <a:prstGeom prst="flowChartOffpageConnector">
@@ -33265,6 +33285,43 @@
                 <a:rPr lang="en-US" sz="1500" dirty="0"/>
                 <a:t>M</a:t>
               </a:r>
+            </a:p>
+          </p:txBody>
+        </p:sp>
+        <p:sp>
+          <p:nvSpPr>
+            <p:cNvPr id="3" name="Diamond 2">
+              <a:extLst>
+                <a:ext uri="{FF2B5EF4-FFF2-40B4-BE49-F238E27FC236}">
+                  <a16:creationId xmlns:a16="http://schemas.microsoft.com/office/drawing/2014/main" id="{F4A621D2-73FC-9B45-1311-B6708BB1332F}"/>
+                </a:ext>
+              </a:extLst>
+            </p:cNvPr>
+            <p:cNvSpPr/>
+            <p:nvPr/>
+          </p:nvSpPr>
+          <p:spPr bwMode="auto">
+            <a:xfrm>
+              <a:off x="5608320" y="4814046"/>
+              <a:ext cx="182880" cy="182880"/>
+            </a:xfrm>
+            <a:prstGeom prst="diamond">
+              <a:avLst/>
+            </a:prstGeom>
+            <a:noFill/>
+            <a:ln w="9525">
+              <a:noFill/>
+              <a:round/>
+              <a:headEnd/>
+              <a:tailEnd/>
+            </a:ln>
+          </p:spPr>
+          <p:txBody>
+            <a:bodyPr wrap="none" lIns="92075" tIns="46038" rIns="92075" bIns="46038" rtlCol="0" anchor="ctr"/>
+            <a:lstStyle/>
+            <a:p>
+              <a:pPr algn="ctr"/>
+              <a:endParaRPr lang="en-US"/>
             </a:p>
           </p:txBody>
         </p:sp>

</xml_diff>